<commit_message>
Auto saved by Logseq
</commit_message>
<xml_diff>
--- a/ppt1.pptx
+++ b/ppt1.pptx
@@ -7,6 +7,7 @@
   <p:sldIdLst>
     <p:sldId id="256" r:id="rId2"/>
     <p:sldId id="257" r:id="rId3"/>
+    <p:sldId id="258" r:id="rId4"/>
   </p:sldIdLst>
   <p:sldSz cx="12192000" cy="6858000"/>
   <p:notesSz cx="6858000" cy="9144000"/>
@@ -3449,7 +3450,7 @@
         <p:spPr/>
         <p:txBody>
           <a:bodyPr>
-            <a:normAutofit fontScale="92500" lnSpcReduction="10000"/>
+            <a:normAutofit/>
           </a:bodyPr>
           <a:lstStyle/>
           <a:p>
@@ -3515,7 +3516,7 @@
           <a:p>
             <a:r>
               <a:rPr lang="en-US" dirty="0"/>
-              <a:t>I could then try to calibrate it with parameters derived from FSPM simulation outputs (i.e. inverse modeling, </a:t>
+              <a:t>I could then try to calibrate STICS with parameters derived from FSPM simulation outputs (i.e. inverse modeling, </a:t>
             </a:r>
             <a:r>
               <a:rPr lang="en-US" dirty="0" err="1"/>
@@ -3529,29 +3530,7 @@
           <a:p>
             <a:r>
               <a:rPr lang="en-US" dirty="0"/>
-              <a:t>Then run simulations with STICS calibrated this way and compare the outputs with the ones in </a:t>
-            </a:r>
-            <a:r>
-              <a:rPr lang="en-US" dirty="0" err="1"/>
-              <a:t>litterature</a:t>
-            </a:r>
-            <a:r>
-              <a:rPr lang="en-US" dirty="0"/>
-              <a:t> and with field data ?</a:t>
-            </a:r>
-          </a:p>
-          <a:p>
-            <a:r>
-              <a:rPr lang="en-US" dirty="0"/>
-              <a:t>Intercropping systems to choose: wheat-pea (</a:t>
-            </a:r>
-            <a:r>
-              <a:rPr lang="en-US" dirty="0" err="1"/>
-              <a:t>Vezy</a:t>
-            </a:r>
-            <a:r>
-              <a:rPr lang="en-US" dirty="0"/>
-              <a:t> et al. 2023), sorghum-cowpea (Traore et al. 2022, 2023) ?</a:t>
+              <a:t>Then run simulations with STICS calibrated this way and compare the outputs with the ones in literature and with field data ?</a:t>
             </a:r>
           </a:p>
         </p:txBody>
@@ -3560,6 +3539,147 @@
     <p:extLst>
       <p:ext uri="{BB962C8B-B14F-4D97-AF65-F5344CB8AC3E}">
         <p14:creationId xmlns:p14="http://schemas.microsoft.com/office/powerpoint/2010/main" val="3201033360"/>
+      </p:ext>
+    </p:extLst>
+  </p:cSld>
+  <p:clrMapOvr>
+    <a:masterClrMapping/>
+  </p:clrMapOvr>
+</p:sld>
+</file>
+
+<file path=ppt/slides/slide3.xml><?xml version="1.0" encoding="utf-8"?>
+<p:sld xmlns:a="http://schemas.openxmlformats.org/drawingml/2006/main" xmlns:r="http://schemas.openxmlformats.org/officeDocument/2006/relationships" xmlns:p="http://schemas.openxmlformats.org/presentationml/2006/main">
+  <p:cSld>
+    <p:spTree>
+      <p:nvGrpSpPr>
+        <p:cNvPr id="1" name=""/>
+        <p:cNvGrpSpPr/>
+        <p:nvPr/>
+      </p:nvGrpSpPr>
+      <p:grpSpPr>
+        <a:xfrm>
+          <a:off x="0" y="0"/>
+          <a:ext cx="0" cy="0"/>
+          <a:chOff x="0" y="0"/>
+          <a:chExt cx="0" cy="0"/>
+        </a:xfrm>
+      </p:grpSpPr>
+      <p:sp>
+        <p:nvSpPr>
+          <p:cNvPr id="2" name="Title 1">
+            <a:extLst>
+              <a:ext uri="{FF2B5EF4-FFF2-40B4-BE49-F238E27FC236}">
+                <a16:creationId xmlns:a16="http://schemas.microsoft.com/office/drawing/2014/main" id="{5DC75F64-FCF9-4F51-BB42-D449A275F708}"/>
+              </a:ext>
+            </a:extLst>
+          </p:cNvPr>
+          <p:cNvSpPr>
+            <a:spLocks noGrp="1"/>
+          </p:cNvSpPr>
+          <p:nvPr>
+            <p:ph type="title"/>
+          </p:nvPr>
+        </p:nvSpPr>
+        <p:spPr/>
+        <p:txBody>
+          <a:bodyPr/>
+          <a:lstStyle/>
+          <a:p>
+            <a:r>
+              <a:rPr lang="en-US" dirty="0"/>
+              <a:t>What I’d need to do</a:t>
+            </a:r>
+          </a:p>
+        </p:txBody>
+      </p:sp>
+      <p:sp>
+        <p:nvSpPr>
+          <p:cNvPr id="3" name="Content Placeholder 2">
+            <a:extLst>
+              <a:ext uri="{FF2B5EF4-FFF2-40B4-BE49-F238E27FC236}">
+                <a16:creationId xmlns:a16="http://schemas.microsoft.com/office/drawing/2014/main" id="{3C43B875-59C6-4136-9118-873306DBFDBA}"/>
+              </a:ext>
+            </a:extLst>
+          </p:cNvPr>
+          <p:cNvSpPr>
+            <a:spLocks noGrp="1"/>
+          </p:cNvSpPr>
+          <p:nvPr>
+            <p:ph idx="1"/>
+          </p:nvPr>
+        </p:nvSpPr>
+        <p:spPr>
+          <a:xfrm>
+            <a:off x="838200" y="1825625"/>
+            <a:ext cx="10515600" cy="4667250"/>
+          </a:xfrm>
+        </p:spPr>
+        <p:txBody>
+          <a:bodyPr>
+            <a:normAutofit/>
+          </a:bodyPr>
+          <a:lstStyle/>
+          <a:p>
+            <a:r>
+              <a:rPr lang="en-US" dirty="0"/>
+              <a:t>Choose intercropping systems: wheat-pea (</a:t>
+            </a:r>
+            <a:r>
+              <a:rPr lang="en-US" dirty="0" err="1"/>
+              <a:t>Vezy</a:t>
+            </a:r>
+            <a:r>
+              <a:rPr lang="en-US" dirty="0"/>
+              <a:t> et al. 2023), sorghum-cowpea (Traore et al. 2022, 2023) ? Which spatial design ?</a:t>
+            </a:r>
+          </a:p>
+          <a:p>
+            <a:r>
+              <a:rPr lang="en-US" dirty="0"/>
+              <a:t>Spot the problematic parameters</a:t>
+            </a:r>
+          </a:p>
+          <a:p>
+            <a:r>
+              <a:rPr lang="en-US" dirty="0"/>
+              <a:t>Choose one or more FSPM (depending on the species chosen, on their ability to model intercrops, </a:t>
+            </a:r>
+            <a:r>
+              <a:rPr lang="en-US" dirty="0" err="1"/>
+              <a:t>etc</a:t>
+            </a:r>
+            <a:r>
+              <a:rPr lang="en-US" dirty="0"/>
+              <a:t>), and learn how to use it to get the outputs I want</a:t>
+            </a:r>
+          </a:p>
+          <a:p>
+            <a:r>
+              <a:rPr lang="en-US" dirty="0"/>
+              <a:t>Learn how to use STICS (in January with Remi), calibrate it, run simulations</a:t>
+            </a:r>
+            <a:r>
+              <a:rPr lang="en-US"/>
+              <a:t>, compare</a:t>
+            </a:r>
+            <a:endParaRPr lang="en-US" dirty="0"/>
+          </a:p>
+          <a:p>
+            <a:r>
+              <a:rPr lang="en-US" dirty="0"/>
+              <a:t>In the meantime, get to know the formalisms of all models and the associated hypotheses</a:t>
+            </a:r>
+          </a:p>
+          <a:p>
+            <a:endParaRPr lang="en-US" dirty="0"/>
+          </a:p>
+        </p:txBody>
+      </p:sp>
+    </p:spTree>
+    <p:extLst>
+      <p:ext uri="{BB962C8B-B14F-4D97-AF65-F5344CB8AC3E}">
+        <p14:creationId xmlns:p14="http://schemas.microsoft.com/office/powerpoint/2010/main" val="60673533"/>
       </p:ext>
     </p:extLst>
   </p:cSld>

</xml_diff>